<commit_message>
Điều chỉnh bài 15 (phân lớp)
</commit_message>
<xml_diff>
--- a/Bai 15 Phan lop va ung dung trong tim kiem Phan 2.pptx
+++ b/Bai 15 Phan lop va ung dung trong tim kiem Phan 2.pptx
@@ -21,9 +21,9 @@
     <p:sldId id="553" r:id="rId12"/>
     <p:sldId id="554" r:id="rId13"/>
     <p:sldId id="546" r:id="rId14"/>
-    <p:sldId id="556" r:id="rId15"/>
-    <p:sldId id="557" r:id="rId16"/>
-    <p:sldId id="547" r:id="rId17"/>
+    <p:sldId id="559" r:id="rId15"/>
+    <p:sldId id="556" r:id="rId16"/>
+    <p:sldId id="557" r:id="rId17"/>
     <p:sldId id="536" r:id="rId18"/>
     <p:sldId id="549" r:id="rId19"/>
     <p:sldId id="558" r:id="rId20"/>
@@ -870,6 +870,110 @@
 </file>
 
 <file path=ppt/notesSlides/notesSlide2.xml><?xml version="1.0" encoding="utf-8"?>
+<p:notes xmlns:a="http://schemas.openxmlformats.org/drawingml/2006/main" xmlns:r="http://schemas.openxmlformats.org/officeDocument/2006/relationships" xmlns:p="http://schemas.openxmlformats.org/presentationml/2006/main">
+  <p:cSld>
+    <p:spTree>
+      <p:nvGrpSpPr>
+        <p:cNvPr id="1" name=""/>
+        <p:cNvGrpSpPr/>
+        <p:nvPr/>
+      </p:nvGrpSpPr>
+      <p:grpSpPr>
+        <a:xfrm>
+          <a:off x="0" y="0"/>
+          <a:ext cx="0" cy="0"/>
+          <a:chOff x="0" y="0"/>
+          <a:chExt cx="0" cy="0"/>
+        </a:xfrm>
+      </p:grpSpPr>
+      <p:sp>
+        <p:nvSpPr>
+          <p:cNvPr id="2" name="Slide Image Placeholder 1"/>
+          <p:cNvSpPr>
+            <a:spLocks noGrp="1" noRot="1" noChangeAspect="1"/>
+          </p:cNvSpPr>
+          <p:nvPr>
+            <p:ph type="sldImg"/>
+          </p:nvPr>
+        </p:nvSpPr>
+        <p:spPr/>
+      </p:sp>
+      <p:sp>
+        <p:nvSpPr>
+          <p:cNvPr id="3" name="Notes Placeholder 2"/>
+          <p:cNvSpPr>
+            <a:spLocks noGrp="1"/>
+          </p:cNvSpPr>
+          <p:nvPr>
+            <p:ph type="body" idx="1"/>
+          </p:nvPr>
+        </p:nvSpPr>
+        <p:spPr/>
+        <p:txBody>
+          <a:bodyPr/>
+          <a:lstStyle/>
+          <a:p>
+            <a:r>
+              <a:rPr lang="en-US" smtClean="0"/>
+              <a:t>Slides cũ:</a:t>
+            </a:r>
+            <a:r>
+              <a:rPr lang="en-US" baseline="0" smtClean="0"/>
+              <a:t> N10 số văn bản thuộc lớp c ko chứa t, N01 số văn bản không thuộc lớp c chứa t.</a:t>
+            </a:r>
+          </a:p>
+          <a:p>
+            <a:r>
+              <a:rPr lang="en-US" baseline="0" smtClean="0"/>
+              <a:t>*Lưu ý: hoán đổi hai giá trị N10 và N01 không làm thay đổi I</a:t>
+            </a:r>
+            <a:endParaRPr lang="vi-VN"/>
+          </a:p>
+        </p:txBody>
+      </p:sp>
+      <p:sp>
+        <p:nvSpPr>
+          <p:cNvPr id="4" name="Slide Number Placeholder 3"/>
+          <p:cNvSpPr>
+            <a:spLocks noGrp="1"/>
+          </p:cNvSpPr>
+          <p:nvPr>
+            <p:ph type="sldNum" sz="quarter" idx="10"/>
+          </p:nvPr>
+        </p:nvSpPr>
+        <p:spPr/>
+        <p:txBody>
+          <a:bodyPr/>
+          <a:lstStyle/>
+          <a:p>
+            <a:pPr>
+              <a:defRPr/>
+            </a:pPr>
+            <a:fld id="{585E8FF7-254D-404A-8133-35E4F866AECA}" type="slidenum">
+              <a:rPr lang="vi-VN" smtClean="0"/>
+              <a:pPr>
+                <a:defRPr/>
+              </a:pPr>
+              <a:t>12</a:t>
+            </a:fld>
+            <a:endParaRPr lang="vi-VN"/>
+          </a:p>
+        </p:txBody>
+      </p:sp>
+    </p:spTree>
+    <p:extLst>
+      <p:ext uri="{BB962C8B-B14F-4D97-AF65-F5344CB8AC3E}">
+        <p14:creationId xmlns:p14="http://schemas.microsoft.com/office/powerpoint/2010/main" val="3630977780"/>
+      </p:ext>
+    </p:extLst>
+  </p:cSld>
+  <p:clrMapOvr>
+    <a:masterClrMapping/>
+  </p:clrMapOvr>
+</p:notes>
+</file>
+
+<file path=ppt/notesSlides/notesSlide3.xml><?xml version="1.0" encoding="utf-8"?>
 <p:notes xmlns:a="http://schemas.openxmlformats.org/drawingml/2006/main" xmlns:r="http://schemas.openxmlformats.org/officeDocument/2006/relationships" xmlns:p="http://schemas.openxmlformats.org/presentationml/2006/main">
   <p:cSld>
     <p:bg>
@@ -7780,23 +7884,7 @@
                   <a:schemeClr val="tx2"/>
                 </a:solidFill>
               </a:rPr>
-              <a:t>Hàm lượng thông tin: Mutual </a:t>
-            </a:r>
-            <a:r>
-              <a:rPr lang="en-US" sz="2400" b="0" smtClean="0">
-                <a:solidFill>
-                  <a:schemeClr val="tx2"/>
-                </a:solidFill>
-              </a:rPr>
-              <a:t>Information; </a:t>
-            </a:r>
-            <a:r>
-              <a:rPr lang="en-US" sz="2400" b="0" smtClean="0">
-                <a:solidFill>
-                  <a:schemeClr val="tx2"/>
-                </a:solidFill>
-              </a:rPr>
-              <a:t>Information Gain.</a:t>
+              <a:t>Hàm lượng thông tin: Mutual Information; Information Gain.</a:t>
             </a:r>
             <a:endParaRPr lang="vi-VN" sz="2400" b="0">
               <a:solidFill>
@@ -7963,7 +8051,7 @@
           <p:nvPr/>
         </p:nvPicPr>
         <p:blipFill>
-          <a:blip r:embed="rId2"/>
+          <a:blip r:embed="rId3"/>
           <a:stretch>
             <a:fillRect/>
           </a:stretch>
@@ -7987,7 +8075,7 @@
           <p:nvPr/>
         </p:nvPicPr>
         <p:blipFill>
-          <a:blip r:embed="rId3"/>
+          <a:blip r:embed="rId4"/>
           <a:stretch>
             <a:fillRect/>
           </a:stretch>
@@ -8082,11 +8170,27 @@
             </a:r>
             <a:r>
               <a:rPr lang="en-US" sz="2200" b="0" dirty="0" smtClean="0"/>
-              <a:t> t; N</a:t>
-            </a:r>
-            <a:r>
-              <a:rPr lang="en-US" sz="2200" b="0" baseline="-25000" dirty="0" smtClean="0"/>
+              <a:t> t</a:t>
+            </a:r>
+            <a:r>
+              <a:rPr lang="en-US" sz="2200" b="0" smtClean="0"/>
+              <a:t>; </a:t>
+            </a:r>
+            <a:r>
+              <a:rPr lang="en-US" sz="2200" b="0" smtClean="0"/>
+              <a:t>N</a:t>
+            </a:r>
+            <a:r>
+              <a:rPr lang="en-US" sz="2200" b="0" baseline="-25000" smtClean="0"/>
               <a:t>10</a:t>
+            </a:r>
+            <a:r>
+              <a:rPr lang="en-US" sz="2200" b="0" smtClean="0"/>
+              <a:t> </a:t>
+            </a:r>
+            <a:r>
+              <a:rPr lang="en-US" sz="2200" b="0" dirty="0" err="1" smtClean="0"/>
+              <a:t>số</a:t>
             </a:r>
             <a:r>
               <a:rPr lang="en-US" sz="2200" b="0" dirty="0" smtClean="0"/>
@@ -8094,115 +8198,55 @@
             </a:r>
             <a:r>
               <a:rPr lang="en-US" sz="2200" b="0" dirty="0" err="1" smtClean="0"/>
-              <a:t>số</a:t>
+              <a:t>văn</a:t>
             </a:r>
             <a:r>
               <a:rPr lang="en-US" sz="2200" b="0" dirty="0" smtClean="0"/>
               <a:t> </a:t>
             </a:r>
             <a:r>
-              <a:rPr lang="en-US" sz="2200" b="0" dirty="0" err="1" smtClean="0"/>
-              <a:t>văn</a:t>
-            </a:r>
-            <a:r>
-              <a:rPr lang="en-US" sz="2200" b="0" dirty="0" smtClean="0"/>
+              <a:rPr lang="en-US" sz="2200" b="0" err="1" smtClean="0"/>
+              <a:t>bản</a:t>
+            </a:r>
+            <a:r>
+              <a:rPr lang="en-US" sz="2200" b="0" smtClean="0"/>
               <a:t> </a:t>
             </a:r>
             <a:r>
-              <a:rPr lang="en-US" sz="2200" b="0" dirty="0" err="1" smtClean="0"/>
-              <a:t>bản</a:t>
-            </a:r>
-            <a:r>
-              <a:rPr lang="en-US" sz="2200" b="0" dirty="0" smtClean="0"/>
+              <a:rPr lang="en-US" sz="2200" b="0" smtClean="0"/>
+              <a:t>chứa t không thuộc lớp c; </a:t>
+            </a:r>
+            <a:r>
+              <a:rPr lang="en-US" sz="2200" b="0" smtClean="0"/>
+              <a:t>N</a:t>
+            </a:r>
+            <a:r>
+              <a:rPr lang="en-US" sz="2200" b="0" baseline="-25000" smtClean="0"/>
+              <a:t>01</a:t>
+            </a:r>
+            <a:r>
+              <a:rPr lang="en-US" sz="2200" b="0" smtClean="0"/>
               <a:t> </a:t>
             </a:r>
             <a:r>
-              <a:rPr lang="en-US" sz="2200" b="0" dirty="0" err="1" smtClean="0"/>
-              <a:t>thuộc</a:t>
-            </a:r>
-            <a:r>
-              <a:rPr lang="en-US" sz="2200" b="0" dirty="0" smtClean="0"/>
+              <a:rPr lang="en-US" sz="2200" b="0" smtClean="0"/>
+              <a:t>#không chứa t, thuộc lớp c; </a:t>
+            </a:r>
+            <a:r>
+              <a:rPr lang="en-US" sz="2200" b="0" smtClean="0"/>
+              <a:t>N</a:t>
+            </a:r>
+            <a:r>
+              <a:rPr lang="en-US" sz="2200" b="0" baseline="-25000" smtClean="0"/>
+              <a:t>00</a:t>
+            </a:r>
+            <a:r>
+              <a:rPr lang="en-US" sz="2200" b="0" smtClean="0"/>
               <a:t> </a:t>
             </a:r>
             <a:r>
-              <a:rPr lang="en-US" sz="2200" b="0" dirty="0" err="1" smtClean="0"/>
-              <a:t>lớp</a:t>
-            </a:r>
-            <a:r>
-              <a:rPr lang="en-US" sz="2200" b="0" dirty="0" smtClean="0"/>
-              <a:t> c </a:t>
-            </a:r>
-            <a:r>
-              <a:rPr lang="en-US" sz="2200" b="0" dirty="0" err="1" smtClean="0"/>
-              <a:t>không</a:t>
-            </a:r>
-            <a:r>
-              <a:rPr lang="en-US" sz="2200" b="0" dirty="0" smtClean="0"/>
-              <a:t> </a:t>
-            </a:r>
-            <a:r>
-              <a:rPr lang="en-US" sz="2200" b="0" dirty="0" err="1" smtClean="0"/>
-              <a:t>chứa</a:t>
-            </a:r>
-            <a:r>
-              <a:rPr lang="en-US" sz="2200" b="0" dirty="0" smtClean="0"/>
-              <a:t> t; N</a:t>
-            </a:r>
-            <a:r>
-              <a:rPr lang="en-US" sz="2200" b="0" baseline="-25000" dirty="0" smtClean="0"/>
-              <a:t>01</a:t>
-            </a:r>
-            <a:r>
-              <a:rPr lang="en-US" sz="2200" b="0" dirty="0" smtClean="0"/>
-              <a:t> </a:t>
-            </a:r>
-            <a:r>
-              <a:rPr lang="en-US" sz="2200" b="0" dirty="0" err="1" smtClean="0"/>
-              <a:t>không</a:t>
-            </a:r>
-            <a:r>
-              <a:rPr lang="en-US" sz="2200" b="0" dirty="0" smtClean="0"/>
-              <a:t> </a:t>
-            </a:r>
-            <a:r>
-              <a:rPr lang="en-US" sz="2200" b="0" dirty="0" err="1" smtClean="0"/>
-              <a:t>thuộc</a:t>
-            </a:r>
-            <a:r>
-              <a:rPr lang="en-US" sz="2200" b="0" dirty="0" smtClean="0"/>
-              <a:t> </a:t>
-            </a:r>
-            <a:r>
-              <a:rPr lang="en-US" sz="2200" b="0" dirty="0" err="1" smtClean="0"/>
-              <a:t>lớp</a:t>
-            </a:r>
-            <a:r>
-              <a:rPr lang="en-US" sz="2200" b="0" dirty="0" smtClean="0"/>
-              <a:t> c, </a:t>
-            </a:r>
-            <a:r>
-              <a:rPr lang="en-US" sz="2200" b="0" dirty="0" err="1" smtClean="0"/>
-              <a:t>chứa</a:t>
-            </a:r>
-            <a:r>
-              <a:rPr lang="en-US" sz="2200" b="0" dirty="0" smtClean="0"/>
-              <a:t> t; N</a:t>
-            </a:r>
-            <a:r>
-              <a:rPr lang="en-US" sz="2200" b="0" baseline="-25000" dirty="0" smtClean="0"/>
-              <a:t>00</a:t>
-            </a:r>
-            <a:r>
-              <a:rPr lang="en-US" sz="2200" b="0" dirty="0" smtClean="0"/>
-              <a:t> </a:t>
-            </a:r>
-            <a:r>
-              <a:rPr lang="en-US" sz="2200" b="0" dirty="0" err="1" smtClean="0"/>
-              <a:t>không</a:t>
-            </a:r>
-            <a:r>
-              <a:rPr lang="en-US" sz="2200" b="0" dirty="0" smtClean="0"/>
-              <a:t> </a:t>
+              <a:rPr lang="en-US" sz="2200" b="0" smtClean="0"/>
+              <a:t>#không </a:t>
             </a:r>
             <a:r>
               <a:rPr lang="en-US" sz="2200" b="0" dirty="0" err="1" smtClean="0"/>
@@ -8510,95 +8554,62 @@
           <a:p>
             <a:pPr eaLnBrk="1" hangingPunct="1"/>
             <a:r>
-              <a:rPr lang="en-US" sz="3600" smtClean="0"/>
-              <a:t>Chi bình phương (2)</a:t>
+              <a:rPr lang="en-US" sz="3600" dirty="0" err="1" smtClean="0"/>
+              <a:t>Kết</a:t>
+            </a:r>
+            <a:r>
+              <a:rPr lang="en-US" sz="3600" dirty="0" smtClean="0"/>
+              <a:t> </a:t>
+            </a:r>
+            <a:r>
+              <a:rPr lang="en-US" sz="3600" dirty="0" err="1" smtClean="0"/>
+              <a:t>quả</a:t>
+            </a:r>
+            <a:r>
+              <a:rPr lang="en-US" sz="3600" dirty="0" smtClean="0"/>
+              <a:t> </a:t>
+            </a:r>
+            <a:r>
+              <a:rPr lang="en-US" sz="3600" dirty="0" err="1" smtClean="0"/>
+              <a:t>trích</a:t>
+            </a:r>
+            <a:r>
+              <a:rPr lang="en-US" sz="3600" dirty="0" smtClean="0"/>
+              <a:t> </a:t>
+            </a:r>
+            <a:r>
+              <a:rPr lang="en-US" sz="3600" dirty="0" err="1" smtClean="0"/>
+              <a:t>chọn</a:t>
+            </a:r>
+            <a:r>
+              <a:rPr lang="en-US" sz="3600" dirty="0" smtClean="0"/>
+              <a:t> </a:t>
+            </a:r>
+            <a:r>
+              <a:rPr lang="en-US" sz="3600" dirty="0" err="1" smtClean="0"/>
+              <a:t>đặc</a:t>
+            </a:r>
+            <a:r>
+              <a:rPr lang="en-US" sz="3600" dirty="0" smtClean="0"/>
+              <a:t> </a:t>
+            </a:r>
+            <a:r>
+              <a:rPr lang="en-US" sz="3600" dirty="0" err="1" smtClean="0"/>
+              <a:t>trưng</a:t>
+            </a:r>
+            <a:r>
+              <a:rPr lang="en-US" sz="3600" dirty="0" smtClean="0"/>
+              <a:t> </a:t>
+            </a:r>
+            <a:r>
+              <a:rPr lang="en-US" sz="3600" dirty="0" err="1" smtClean="0"/>
+              <a:t>trên</a:t>
+            </a:r>
+            <a:r>
+              <a:rPr lang="en-US" sz="3600" dirty="0" smtClean="0"/>
+              <a:t> Reuters</a:t>
             </a:r>
             <a:endParaRPr lang="vi-VN" sz="3600" dirty="0" smtClean="0"/>
-          </a:p>
-        </p:txBody>
-      </p:sp>
-      <p:sp>
-        <p:nvSpPr>
-          <p:cNvPr id="6147" name="Rectangle 3"/>
-          <p:cNvSpPr>
-            <a:spLocks noGrp="1" noChangeArrowheads="1"/>
-          </p:cNvSpPr>
-          <p:nvPr>
-            <p:ph type="body" idx="1"/>
-          </p:nvPr>
-        </p:nvSpPr>
-        <p:spPr>
-          <a:xfrm>
-            <a:off x="467544" y="2017713"/>
-            <a:ext cx="8487544" cy="4723655"/>
-          </a:xfrm>
-        </p:spPr>
-        <p:txBody>
-          <a:bodyPr/>
-          <a:lstStyle/>
-          <a:p>
-            <a:pPr algn="just" eaLnBrk="1" hangingPunct="1">
-              <a:defRPr/>
-            </a:pPr>
-            <a:r>
-              <a:rPr lang="en-US" sz="2800" smtClean="0"/>
-              <a:t>Dùng để đánh giá tính độc lập của hai sự kiện:</a:t>
-            </a:r>
-          </a:p>
-          <a:p>
-            <a:pPr lvl="1" algn="just" eaLnBrk="1" hangingPunct="1">
-              <a:defRPr/>
-            </a:pPr>
-            <a:r>
-              <a:rPr lang="en-US" sz="2000" smtClean="0"/>
-              <a:t>Phân lớp văn bản: sự kiện xuất hiện lớp và sự kiện xuất hiện từ.</a:t>
-            </a:r>
-          </a:p>
-          <a:p>
-            <a:pPr algn="just" eaLnBrk="1" hangingPunct="1">
-              <a:defRPr/>
-            </a:pPr>
-            <a:r>
-              <a:rPr lang="en-US" sz="2800" smtClean="0"/>
-              <a:t>Xếp hạng từ theo đại lượng sau:</a:t>
-            </a:r>
-          </a:p>
-          <a:p>
-            <a:pPr lvl="1" algn="just" eaLnBrk="1" hangingPunct="1">
-              <a:defRPr/>
-            </a:pPr>
-            <a:r>
-              <a:rPr lang="en-US" sz="2400" smtClean="0"/>
-              <a:t>Chọn chi bình phương nhỏ.</a:t>
-            </a:r>
-          </a:p>
-          <a:p>
-            <a:pPr algn="just" eaLnBrk="1" hangingPunct="1">
-              <a:defRPr/>
-            </a:pPr>
-            <a:endParaRPr lang="en-US" sz="2800"/>
-          </a:p>
-          <a:p>
-            <a:pPr algn="just" eaLnBrk="1" hangingPunct="1">
-              <a:defRPr/>
-            </a:pPr>
-            <a:endParaRPr lang="en-US" sz="2800" smtClean="0"/>
-          </a:p>
-          <a:p>
-            <a:pPr algn="just" eaLnBrk="1" hangingPunct="1">
-              <a:defRPr/>
-            </a:pPr>
-            <a:r>
-              <a:rPr lang="en-US" sz="2800" smtClean="0"/>
-              <a:t>Chi bình phương nhỏ thể hiện mối liên hệ chặt chẽ giữa sự xuất hiện của từ và sự xuất hiện của lớp, thể hiện khả năng từ là một đặc trưng tốt để phân lớp.</a:t>
-            </a:r>
-          </a:p>
-          <a:p>
-            <a:pPr marL="0" indent="0" algn="just" eaLnBrk="1" hangingPunct="1">
-              <a:buNone/>
-              <a:defRPr/>
-            </a:pPr>
-            <a:endParaRPr lang="en-US" sz="2400" dirty="0" smtClean="0"/>
           </a:p>
         </p:txBody>
       </p:sp>
@@ -8626,6 +8637,209 @@
                 <a:defRPr/>
               </a:pPr>
               <a:t>14</a:t>
+            </a:fld>
+            <a:endParaRPr lang="vi-VN"/>
+          </a:p>
+        </p:txBody>
+      </p:sp>
+      <p:pic>
+        <p:nvPicPr>
+          <p:cNvPr id="5" name="Picture 4" descr="1415.png"/>
+          <p:cNvPicPr>
+            <a:picLocks noChangeAspect="1"/>
+          </p:cNvPicPr>
+          <p:nvPr/>
+        </p:nvPicPr>
+        <p:blipFill>
+          <a:blip r:embed="rId2"/>
+          <a:stretch>
+            <a:fillRect/>
+          </a:stretch>
+        </p:blipFill>
+        <p:spPr>
+          <a:xfrm>
+            <a:off x="611560" y="1818244"/>
+            <a:ext cx="6840760" cy="5056215"/>
+          </a:xfrm>
+          <a:prstGeom prst="rect">
+            <a:avLst/>
+          </a:prstGeom>
+        </p:spPr>
+      </p:pic>
+    </p:spTree>
+    <p:extLst>
+      <p:ext uri="{BB962C8B-B14F-4D97-AF65-F5344CB8AC3E}">
+        <p14:creationId xmlns:p14="http://schemas.microsoft.com/office/powerpoint/2010/main" val="167105955"/>
+      </p:ext>
+    </p:extLst>
+  </p:cSld>
+  <p:clrMapOvr>
+    <a:masterClrMapping/>
+  </p:clrMapOvr>
+  <p:timing>
+    <p:tnLst>
+      <p:par>
+        <p:cTn id="1" dur="indefinite" restart="never" nodeType="tmRoot"/>
+      </p:par>
+    </p:tnLst>
+  </p:timing>
+</p:sld>
+</file>
+
+<file path=ppt/slides/slide15.xml><?xml version="1.0" encoding="utf-8"?>
+<p:sld xmlns:a="http://schemas.openxmlformats.org/drawingml/2006/main" xmlns:r="http://schemas.openxmlformats.org/officeDocument/2006/relationships" xmlns:p="http://schemas.openxmlformats.org/presentationml/2006/main">
+  <p:cSld>
+    <p:spTree>
+      <p:nvGrpSpPr>
+        <p:cNvPr id="1" name=""/>
+        <p:cNvGrpSpPr/>
+        <p:nvPr/>
+      </p:nvGrpSpPr>
+      <p:grpSpPr>
+        <a:xfrm>
+          <a:off x="0" y="0"/>
+          <a:ext cx="0" cy="0"/>
+          <a:chOff x="0" y="0"/>
+          <a:chExt cx="0" cy="0"/>
+        </a:xfrm>
+      </p:grpSpPr>
+      <p:sp>
+        <p:nvSpPr>
+          <p:cNvPr id="6146" name="Rectangle 2"/>
+          <p:cNvSpPr>
+            <a:spLocks noGrp="1" noChangeArrowheads="1"/>
+          </p:cNvSpPr>
+          <p:nvPr>
+            <p:ph type="title"/>
+          </p:nvPr>
+        </p:nvSpPr>
+        <p:spPr/>
+        <p:txBody>
+          <a:bodyPr/>
+          <a:lstStyle/>
+          <a:p>
+            <a:pPr eaLnBrk="1" hangingPunct="1"/>
+            <a:r>
+              <a:rPr lang="en-US" sz="3600" smtClean="0"/>
+              <a:t>Chi bình </a:t>
+            </a:r>
+            <a:r>
+              <a:rPr lang="en-US" sz="3600" smtClean="0"/>
+              <a:t>phương</a:t>
+            </a:r>
+            <a:endParaRPr lang="vi-VN" sz="3600" dirty="0" smtClean="0"/>
+          </a:p>
+        </p:txBody>
+      </p:sp>
+      <p:sp>
+        <p:nvSpPr>
+          <p:cNvPr id="6147" name="Rectangle 3"/>
+          <p:cNvSpPr>
+            <a:spLocks noGrp="1" noChangeArrowheads="1"/>
+          </p:cNvSpPr>
+          <p:nvPr>
+            <p:ph type="body" idx="1"/>
+          </p:nvPr>
+        </p:nvSpPr>
+        <p:spPr>
+          <a:xfrm>
+            <a:off x="467544" y="2017713"/>
+            <a:ext cx="8487544" cy="4723655"/>
+          </a:xfrm>
+        </p:spPr>
+        <p:txBody>
+          <a:bodyPr/>
+          <a:lstStyle/>
+          <a:p>
+            <a:pPr algn="just" eaLnBrk="1" hangingPunct="1">
+              <a:defRPr/>
+            </a:pPr>
+            <a:r>
+              <a:rPr lang="en-US" sz="2800" smtClean="0"/>
+              <a:t>Dùng để đánh giá tính độc lập của hai sự kiện:</a:t>
+            </a:r>
+          </a:p>
+          <a:p>
+            <a:pPr lvl="1" algn="just" eaLnBrk="1" hangingPunct="1">
+              <a:defRPr/>
+            </a:pPr>
+            <a:r>
+              <a:rPr lang="en-US" sz="2000" smtClean="0"/>
+              <a:t>Phân lớp văn bản: sự kiện xuất hiện lớp và sự kiện xuất hiện từ.</a:t>
+            </a:r>
+          </a:p>
+          <a:p>
+            <a:pPr algn="just" eaLnBrk="1" hangingPunct="1">
+              <a:defRPr/>
+            </a:pPr>
+            <a:r>
+              <a:rPr lang="en-US" sz="2800" smtClean="0"/>
+              <a:t>Xếp hạng từ theo đại lượng sau:</a:t>
+            </a:r>
+          </a:p>
+          <a:p>
+            <a:pPr lvl="1" algn="just" eaLnBrk="1" hangingPunct="1">
+              <a:defRPr/>
+            </a:pPr>
+            <a:r>
+              <a:rPr lang="en-US" sz="2400" smtClean="0"/>
+              <a:t>Chọn chi bình phương nhỏ.</a:t>
+            </a:r>
+          </a:p>
+          <a:p>
+            <a:pPr algn="just" eaLnBrk="1" hangingPunct="1">
+              <a:defRPr/>
+            </a:pPr>
+            <a:endParaRPr lang="en-US" sz="2800"/>
+          </a:p>
+          <a:p>
+            <a:pPr algn="just" eaLnBrk="1" hangingPunct="1">
+              <a:defRPr/>
+            </a:pPr>
+            <a:endParaRPr lang="en-US" sz="2800" smtClean="0"/>
+          </a:p>
+          <a:p>
+            <a:pPr algn="just" eaLnBrk="1" hangingPunct="1">
+              <a:defRPr/>
+            </a:pPr>
+            <a:r>
+              <a:rPr lang="en-US" sz="2800" smtClean="0"/>
+              <a:t>Chi bình phương nhỏ thể hiện mối liên hệ chặt chẽ giữa sự xuất hiện của từ và sự xuất hiện của lớp, thể hiện khả năng từ là một đặc trưng tốt để phân lớp.</a:t>
+            </a:r>
+          </a:p>
+          <a:p>
+            <a:pPr marL="0" indent="0" algn="just" eaLnBrk="1" hangingPunct="1">
+              <a:buNone/>
+              <a:defRPr/>
+            </a:pPr>
+            <a:endParaRPr lang="en-US" sz="2400" dirty="0" smtClean="0"/>
+          </a:p>
+        </p:txBody>
+      </p:sp>
+      <p:sp>
+        <p:nvSpPr>
+          <p:cNvPr id="2" name="Slide Number Placeholder 1"/>
+          <p:cNvSpPr>
+            <a:spLocks noGrp="1"/>
+          </p:cNvSpPr>
+          <p:nvPr>
+            <p:ph type="sldNum" sz="quarter" idx="12"/>
+          </p:nvPr>
+        </p:nvSpPr>
+        <p:spPr/>
+        <p:txBody>
+          <a:bodyPr/>
+          <a:lstStyle/>
+          <a:p>
+            <a:pPr>
+              <a:defRPr/>
+            </a:pPr>
+            <a:fld id="{A81E07A1-38DA-436E-9EB2-1E501CB9FFA7}" type="slidenum">
+              <a:rPr lang="vi-VN" smtClean="0"/>
+              <a:pPr>
+                <a:defRPr/>
+              </a:pPr>
+              <a:t>15</a:t>
             </a:fld>
             <a:endParaRPr lang="vi-VN"/>
           </a:p>
@@ -8705,7 +8919,7 @@
 </p:sld>
 </file>
 
-<file path=ppt/slides/slide15.xml><?xml version="1.0" encoding="utf-8"?>
+<file path=ppt/slides/slide16.xml><?xml version="1.0" encoding="utf-8"?>
 <p:sld xmlns:a="http://schemas.openxmlformats.org/drawingml/2006/main" xmlns:r="http://schemas.openxmlformats.org/officeDocument/2006/relationships" xmlns:p="http://schemas.openxmlformats.org/presentationml/2006/main">
   <p:cSld>
     <p:spTree>
@@ -8740,7 +8954,11 @@
             <a:pPr eaLnBrk="1" hangingPunct="1"/>
             <a:r>
               <a:rPr lang="en-US" sz="3600" smtClean="0"/>
-              <a:t>Chi bình phương (3)</a:t>
+              <a:t>Chi bình phương </a:t>
+            </a:r>
+            <a:r>
+              <a:rPr lang="en-US" sz="3600" smtClean="0"/>
+              <a:t>(2)</a:t>
             </a:r>
             <a:endParaRPr lang="vi-VN" sz="3600" dirty="0" smtClean="0"/>
           </a:p>
@@ -8769,7 +8987,7 @@
               <a:pPr>
                 <a:defRPr/>
               </a:pPr>
-              <a:t>15</a:t>
+              <a:t>16</a:t>
             </a:fld>
             <a:endParaRPr lang="vi-VN"/>
           </a:p>
@@ -9033,172 +9251,6 @@
     <p:extLst>
       <p:ext uri="{BB962C8B-B14F-4D97-AF65-F5344CB8AC3E}">
         <p14:creationId xmlns:p14="http://schemas.microsoft.com/office/powerpoint/2010/main" val="2723551812"/>
-      </p:ext>
-    </p:extLst>
-  </p:cSld>
-  <p:clrMapOvr>
-    <a:masterClrMapping/>
-  </p:clrMapOvr>
-  <p:timing>
-    <p:tnLst>
-      <p:par>
-        <p:cTn id="1" dur="indefinite" restart="never" nodeType="tmRoot"/>
-      </p:par>
-    </p:tnLst>
-  </p:timing>
-</p:sld>
-</file>
-
-<file path=ppt/slides/slide16.xml><?xml version="1.0" encoding="utf-8"?>
-<p:sld xmlns:a="http://schemas.openxmlformats.org/drawingml/2006/main" xmlns:r="http://schemas.openxmlformats.org/officeDocument/2006/relationships" xmlns:p="http://schemas.openxmlformats.org/presentationml/2006/main">
-  <p:cSld>
-    <p:spTree>
-      <p:nvGrpSpPr>
-        <p:cNvPr id="1" name=""/>
-        <p:cNvGrpSpPr/>
-        <p:nvPr/>
-      </p:nvGrpSpPr>
-      <p:grpSpPr>
-        <a:xfrm>
-          <a:off x="0" y="0"/>
-          <a:ext cx="0" cy="0"/>
-          <a:chOff x="0" y="0"/>
-          <a:chExt cx="0" cy="0"/>
-        </a:xfrm>
-      </p:grpSpPr>
-      <p:sp>
-        <p:nvSpPr>
-          <p:cNvPr id="6146" name="Rectangle 2"/>
-          <p:cNvSpPr>
-            <a:spLocks noGrp="1" noChangeArrowheads="1"/>
-          </p:cNvSpPr>
-          <p:nvPr>
-            <p:ph type="title"/>
-          </p:nvPr>
-        </p:nvSpPr>
-        <p:spPr/>
-        <p:txBody>
-          <a:bodyPr/>
-          <a:lstStyle/>
-          <a:p>
-            <a:pPr eaLnBrk="1" hangingPunct="1"/>
-            <a:r>
-              <a:rPr lang="en-US" sz="3600" dirty="0" err="1" smtClean="0"/>
-              <a:t>Kết</a:t>
-            </a:r>
-            <a:r>
-              <a:rPr lang="en-US" sz="3600" dirty="0" smtClean="0"/>
-              <a:t> </a:t>
-            </a:r>
-            <a:r>
-              <a:rPr lang="en-US" sz="3600" dirty="0" err="1" smtClean="0"/>
-              <a:t>quả</a:t>
-            </a:r>
-            <a:r>
-              <a:rPr lang="en-US" sz="3600" dirty="0" smtClean="0"/>
-              <a:t> </a:t>
-            </a:r>
-            <a:r>
-              <a:rPr lang="en-US" sz="3600" dirty="0" err="1" smtClean="0"/>
-              <a:t>trích</a:t>
-            </a:r>
-            <a:r>
-              <a:rPr lang="en-US" sz="3600" dirty="0" smtClean="0"/>
-              <a:t> </a:t>
-            </a:r>
-            <a:r>
-              <a:rPr lang="en-US" sz="3600" dirty="0" err="1" smtClean="0"/>
-              <a:t>chọn</a:t>
-            </a:r>
-            <a:r>
-              <a:rPr lang="en-US" sz="3600" dirty="0" smtClean="0"/>
-              <a:t> </a:t>
-            </a:r>
-            <a:r>
-              <a:rPr lang="en-US" sz="3600" dirty="0" err="1" smtClean="0"/>
-              <a:t>đặc</a:t>
-            </a:r>
-            <a:r>
-              <a:rPr lang="en-US" sz="3600" dirty="0" smtClean="0"/>
-              <a:t> </a:t>
-            </a:r>
-            <a:r>
-              <a:rPr lang="en-US" sz="3600" dirty="0" err="1" smtClean="0"/>
-              <a:t>trưng</a:t>
-            </a:r>
-            <a:r>
-              <a:rPr lang="en-US" sz="3600" dirty="0" smtClean="0"/>
-              <a:t> </a:t>
-            </a:r>
-            <a:r>
-              <a:rPr lang="en-US" sz="3600" dirty="0" err="1" smtClean="0"/>
-              <a:t>trên</a:t>
-            </a:r>
-            <a:r>
-              <a:rPr lang="en-US" sz="3600" dirty="0" smtClean="0"/>
-              <a:t> Reuters</a:t>
-            </a:r>
-            <a:endParaRPr lang="vi-VN" sz="3600" dirty="0" smtClean="0"/>
-          </a:p>
-        </p:txBody>
-      </p:sp>
-      <p:sp>
-        <p:nvSpPr>
-          <p:cNvPr id="2" name="Slide Number Placeholder 1"/>
-          <p:cNvSpPr>
-            <a:spLocks noGrp="1"/>
-          </p:cNvSpPr>
-          <p:nvPr>
-            <p:ph type="sldNum" sz="quarter" idx="12"/>
-          </p:nvPr>
-        </p:nvSpPr>
-        <p:spPr/>
-        <p:txBody>
-          <a:bodyPr/>
-          <a:lstStyle/>
-          <a:p>
-            <a:pPr>
-              <a:defRPr/>
-            </a:pPr>
-            <a:fld id="{A81E07A1-38DA-436E-9EB2-1E501CB9FFA7}" type="slidenum">
-              <a:rPr lang="vi-VN" smtClean="0"/>
-              <a:pPr>
-                <a:defRPr/>
-              </a:pPr>
-              <a:t>16</a:t>
-            </a:fld>
-            <a:endParaRPr lang="vi-VN"/>
-          </a:p>
-        </p:txBody>
-      </p:sp>
-      <p:pic>
-        <p:nvPicPr>
-          <p:cNvPr id="5" name="Picture 4" descr="1415.png"/>
-          <p:cNvPicPr>
-            <a:picLocks noChangeAspect="1"/>
-          </p:cNvPicPr>
-          <p:nvPr/>
-        </p:nvPicPr>
-        <p:blipFill>
-          <a:blip r:embed="rId2"/>
-          <a:stretch>
-            <a:fillRect/>
-          </a:stretch>
-        </p:blipFill>
-        <p:spPr>
-          <a:xfrm>
-            <a:off x="611560" y="1818244"/>
-            <a:ext cx="6840760" cy="5056215"/>
-          </a:xfrm>
-          <a:prstGeom prst="rect">
-            <a:avLst/>
-          </a:prstGeom>
-        </p:spPr>
-      </p:pic>
-    </p:spTree>
-    <p:extLst>
-      <p:ext uri="{BB962C8B-B14F-4D97-AF65-F5344CB8AC3E}">
-        <p14:creationId xmlns:p14="http://schemas.microsoft.com/office/powerpoint/2010/main" val="1591538016"/>
       </p:ext>
     </p:extLst>
   </p:cSld>
@@ -9652,12 +9704,12 @@
               <a:defRPr/>
             </a:pPr>
             <a:r>
-              <a:rPr lang="en-US" sz="2400" dirty="0" err="1" smtClean="0"/>
-              <a:t>Tính</a:t>
+              <a:rPr lang="en-US" sz="2400" smtClean="0"/>
+              <a:t>Hãy thiết lập </a:t>
             </a:r>
             <a:r>
               <a:rPr lang="en-US" sz="2400" dirty="0" smtClean="0"/>
-              <a:t> ma </a:t>
+              <a:t>ma </a:t>
             </a:r>
             <a:r>
               <a:rPr lang="en-US" sz="2400" dirty="0" err="1" smtClean="0"/>
@@ -9676,36 +9728,12 @@
               <a:t> </a:t>
             </a:r>
             <a:r>
-              <a:rPr lang="en-US" sz="2400" dirty="0" err="1" smtClean="0"/>
+              <a:rPr lang="en-US" sz="2400" err="1" smtClean="0"/>
               <a:t>lẫn</a:t>
             </a:r>
             <a:r>
-              <a:rPr lang="en-US" sz="2400" dirty="0" smtClean="0"/>
-              <a:t> </a:t>
-            </a:r>
-            <a:r>
-              <a:rPr lang="en-US" sz="2400" dirty="0" err="1" smtClean="0"/>
-              <a:t>tương</a:t>
-            </a:r>
-            <a:r>
-              <a:rPr lang="en-US" sz="2400" dirty="0" smtClean="0"/>
-              <a:t> </a:t>
-            </a:r>
-            <a:r>
-              <a:rPr lang="en-US" sz="2400" dirty="0" err="1" smtClean="0"/>
-              <a:t>tự</a:t>
-            </a:r>
-            <a:r>
-              <a:rPr lang="en-US" sz="2400" dirty="0" smtClean="0"/>
-              <a:t> poultry/EXPORT </a:t>
-            </a:r>
-            <a:r>
-              <a:rPr lang="en-US" sz="2400" dirty="0" err="1" smtClean="0"/>
-              <a:t>cho</a:t>
-            </a:r>
-            <a:r>
-              <a:rPr lang="en-US" sz="2400" dirty="0" smtClean="0"/>
-              <a:t> </a:t>
+              <a:rPr lang="en-US" sz="2400" smtClean="0"/>
+              <a:t> cho </a:t>
             </a:r>
             <a:r>
               <a:rPr lang="en-US" sz="2400" dirty="0" err="1" smtClean="0"/>
@@ -9761,20 +9789,16 @@
               <a:t> </a:t>
             </a:r>
             <a:r>
-              <a:rPr lang="en-US" sz="2400" dirty="0" err="1" smtClean="0"/>
+              <a:rPr lang="en-US" sz="2400" err="1" smtClean="0"/>
               <a:t>lẫn</a:t>
             </a:r>
             <a:r>
+              <a:rPr lang="en-US" sz="2400" smtClean="0"/>
+              <a:t> bất kỳ sao cho MI </a:t>
+            </a:r>
+            <a:r>
               <a:rPr lang="en-US" sz="2400" dirty="0" smtClean="0"/>
-              <a:t> </a:t>
-            </a:r>
-            <a:r>
-              <a:rPr lang="en-US" sz="2400" dirty="0" err="1" smtClean="0"/>
-              <a:t>mà</a:t>
-            </a:r>
-            <a:r>
-              <a:rPr lang="en-US" sz="2400" dirty="0" smtClean="0"/>
-              <a:t> MI = 0</a:t>
+              <a:t>= 0</a:t>
             </a:r>
             <a:endParaRPr lang="en-US" sz="2000" dirty="0" smtClean="0"/>
           </a:p>
@@ -9811,26 +9835,56 @@
       </p:sp>
       <p:pic>
         <p:nvPicPr>
-          <p:cNvPr id="6" name="Picture 5" descr="1418.png"/>
+          <p:cNvPr id="1026" name="Picture 2"/>
           <p:cNvPicPr>
-            <a:picLocks noChangeAspect="1"/>
+            <a:picLocks noChangeAspect="1" noChangeArrowheads="1"/>
           </p:cNvPicPr>
           <p:nvPr/>
         </p:nvPicPr>
         <p:blipFill>
-          <a:blip r:embed="rId2"/>
+          <a:blip r:embed="rId2">
+            <a:extLst>
+              <a:ext uri="{28A0092B-C50C-407E-A947-70E740481C1C}">
+                <a14:useLocalDpi xmlns:a14="http://schemas.microsoft.com/office/drawing/2010/main" val="0"/>
+              </a:ext>
+            </a:extLst>
+          </a:blip>
+          <a:srcRect/>
           <a:stretch>
             <a:fillRect/>
           </a:stretch>
         </p:blipFill>
-        <p:spPr>
+        <p:spPr bwMode="auto">
           <a:xfrm>
-            <a:off x="755576" y="3284984"/>
-            <a:ext cx="7319746" cy="3464758"/>
+            <a:off x="755576" y="2996952"/>
+            <a:ext cx="7324725" cy="3457575"/>
           </a:xfrm>
           <a:prstGeom prst="rect">
             <a:avLst/>
           </a:prstGeom>
+          <a:noFill/>
+          <a:ln>
+            <a:noFill/>
+          </a:ln>
+          <a:extLst>
+            <a:ext uri="{909E8E84-426E-40DD-AFC4-6F175D3DCCD1}">
+              <a14:hiddenFill xmlns:a14="http://schemas.microsoft.com/office/drawing/2010/main">
+                <a:solidFill>
+                  <a:schemeClr val="accent1"/>
+                </a:solidFill>
+              </a14:hiddenFill>
+            </a:ext>
+            <a:ext uri="{91240B29-F687-4F45-9708-019B960494DF}">
+              <a14:hiddenLine xmlns:a14="http://schemas.microsoft.com/office/drawing/2010/main" w="9525">
+                <a:solidFill>
+                  <a:schemeClr val="tx1"/>
+                </a:solidFill>
+                <a:miter lim="800000"/>
+                <a:headEnd/>
+                <a:tailEnd/>
+              </a14:hiddenLine>
+            </a:ext>
+          </a:extLst>
         </p:spPr>
       </p:pic>
     </p:spTree>
@@ -9965,7 +10019,7 @@
             </a:pPr>
             <a:r>
               <a:rPr lang="en-US" sz="2400" smtClean="0"/>
-              <a:t>Từ t và lớp c hoàn toàn phụ thuộc lẫn nhau.</a:t>
+              <a:t>Từ t và lớp c hoàn toàn phụ thuộc.</a:t>
             </a:r>
             <a:endParaRPr lang="en-US" sz="2400" dirty="0" smtClean="0"/>
           </a:p>
@@ -12264,11 +12318,7 @@
             </a:r>
             <a:r>
               <a:rPr lang="en-US" sz="2800" smtClean="0"/>
-              <a:t>đặc </a:t>
-            </a:r>
-            <a:r>
-              <a:rPr lang="en-US" sz="2800" smtClean="0"/>
-              <a:t>trưng mà </a:t>
+              <a:t>đặc trưng mà </a:t>
             </a:r>
             <a:r>
               <a:rPr lang="en-US" sz="2800"/>
@@ -12618,15 +12668,7 @@
             </a:r>
             <a:r>
               <a:rPr lang="en-US" sz="2800" smtClean="0"/>
-              <a:t> </a:t>
-            </a:r>
-            <a:r>
-              <a:rPr lang="en-US" sz="2800" smtClean="0"/>
-              <a:t>để xếp các văn bản chứa t vào </a:t>
-            </a:r>
-            <a:r>
-              <a:rPr lang="en-US" sz="2800" smtClean="0"/>
-              <a:t>lớp </a:t>
+              <a:t> để xếp các văn bản chứa t vào lớp </a:t>
             </a:r>
             <a:r>
               <a:rPr lang="en-US" sz="2800" dirty="0" smtClean="0"/>

</xml_diff>